<commit_message>
Ajout de l'exercice 3 JS
</commit_message>
<xml_diff>
--- a/JavaScript/1. Présentation/Cours JS - v1.0.pptx
+++ b/JavaScript/1. Présentation/Cours JS - v1.0.pptx
@@ -17306,7 +17306,7 @@
           <a:p>
             <a:fld id="{83484A92-80DB-45F2-84F5-0D1BF1E89935}" type="datetimeFigureOut">
               <a:rPr lang="fr-CA" smtClean="0"/>
-              <a:t>2018-04-24</a:t>
+              <a:t>2018-05-02</a:t>
             </a:fld>
             <a:endParaRPr lang="fr-CA"/>
           </a:p>
@@ -17705,7 +17705,7 @@
           <a:p>
             <a:fld id="{7946004B-0E6B-4AC3-A8D3-BFF0512C2F93}" type="datetimeFigureOut">
               <a:rPr lang="fr-CA" smtClean="0"/>
-              <a:t>2018-04-24</a:t>
+              <a:t>2018-05-02</a:t>
             </a:fld>
             <a:endParaRPr lang="fr-CA"/>
           </a:p>
@@ -17875,7 +17875,7 @@
           <a:p>
             <a:fld id="{7946004B-0E6B-4AC3-A8D3-BFF0512C2F93}" type="datetimeFigureOut">
               <a:rPr lang="fr-CA" smtClean="0"/>
-              <a:t>2018-04-24</a:t>
+              <a:t>2018-05-02</a:t>
             </a:fld>
             <a:endParaRPr lang="fr-CA"/>
           </a:p>
@@ -18055,7 +18055,7 @@
           <a:p>
             <a:fld id="{7946004B-0E6B-4AC3-A8D3-BFF0512C2F93}" type="datetimeFigureOut">
               <a:rPr lang="fr-CA" smtClean="0"/>
-              <a:t>2018-04-24</a:t>
+              <a:t>2018-05-02</a:t>
             </a:fld>
             <a:endParaRPr lang="fr-CA"/>
           </a:p>
@@ -18225,7 +18225,7 @@
           <a:p>
             <a:fld id="{7946004B-0E6B-4AC3-A8D3-BFF0512C2F93}" type="datetimeFigureOut">
               <a:rPr lang="fr-CA" smtClean="0"/>
-              <a:t>2018-04-24</a:t>
+              <a:t>2018-05-02</a:t>
             </a:fld>
             <a:endParaRPr lang="fr-CA"/>
           </a:p>
@@ -18471,7 +18471,7 @@
           <a:p>
             <a:fld id="{7946004B-0E6B-4AC3-A8D3-BFF0512C2F93}" type="datetimeFigureOut">
               <a:rPr lang="fr-CA" smtClean="0"/>
-              <a:t>2018-04-24</a:t>
+              <a:t>2018-05-02</a:t>
             </a:fld>
             <a:endParaRPr lang="fr-CA"/>
           </a:p>
@@ -18703,7 +18703,7 @@
           <a:p>
             <a:fld id="{7946004B-0E6B-4AC3-A8D3-BFF0512C2F93}" type="datetimeFigureOut">
               <a:rPr lang="fr-CA" smtClean="0"/>
-              <a:t>2018-04-24</a:t>
+              <a:t>2018-05-02</a:t>
             </a:fld>
             <a:endParaRPr lang="fr-CA"/>
           </a:p>
@@ -19070,7 +19070,7 @@
           <a:p>
             <a:fld id="{7946004B-0E6B-4AC3-A8D3-BFF0512C2F93}" type="datetimeFigureOut">
               <a:rPr lang="fr-CA" smtClean="0"/>
-              <a:t>2018-04-24</a:t>
+              <a:t>2018-05-02</a:t>
             </a:fld>
             <a:endParaRPr lang="fr-CA"/>
           </a:p>
@@ -19188,7 +19188,7 @@
           <a:p>
             <a:fld id="{7946004B-0E6B-4AC3-A8D3-BFF0512C2F93}" type="datetimeFigureOut">
               <a:rPr lang="fr-CA" smtClean="0"/>
-              <a:t>2018-04-24</a:t>
+              <a:t>2018-05-02</a:t>
             </a:fld>
             <a:endParaRPr lang="fr-CA"/>
           </a:p>
@@ -19283,7 +19283,7 @@
           <a:p>
             <a:fld id="{7946004B-0E6B-4AC3-A8D3-BFF0512C2F93}" type="datetimeFigureOut">
               <a:rPr lang="fr-CA" smtClean="0"/>
-              <a:t>2018-04-24</a:t>
+              <a:t>2018-05-02</a:t>
             </a:fld>
             <a:endParaRPr lang="fr-CA"/>
           </a:p>
@@ -19560,7 +19560,7 @@
           <a:p>
             <a:fld id="{7946004B-0E6B-4AC3-A8D3-BFF0512C2F93}" type="datetimeFigureOut">
               <a:rPr lang="fr-CA" smtClean="0"/>
-              <a:t>2018-04-24</a:t>
+              <a:t>2018-05-02</a:t>
             </a:fld>
             <a:endParaRPr lang="fr-CA"/>
           </a:p>
@@ -19817,7 +19817,7 @@
           <a:p>
             <a:fld id="{7946004B-0E6B-4AC3-A8D3-BFF0512C2F93}" type="datetimeFigureOut">
               <a:rPr lang="fr-CA" smtClean="0"/>
-              <a:t>2018-04-24</a:t>
+              <a:t>2018-05-02</a:t>
             </a:fld>
             <a:endParaRPr lang="fr-CA"/>
           </a:p>
@@ -20030,7 +20030,7 @@
           <a:p>
             <a:fld id="{7946004B-0E6B-4AC3-A8D3-BFF0512C2F93}" type="datetimeFigureOut">
               <a:rPr lang="fr-CA" smtClean="0"/>
-              <a:t>2018-04-24</a:t>
+              <a:t>2018-05-02</a:t>
             </a:fld>
             <a:endParaRPr lang="fr-CA"/>
           </a:p>

</xml_diff>

<commit_message>
Fin du projet synthèse
</commit_message>
<xml_diff>
--- a/JavaScript/1. Présentation/Cours JS - v1.0.pptx
+++ b/JavaScript/1. Présentation/Cours JS - v1.0.pptx
@@ -5,7 +5,7 @@
     <p:sldMasterId id="2147483684" r:id="rId1"/>
   </p:sldMasterIdLst>
   <p:notesMasterIdLst>
-    <p:notesMasterId r:id="rId58"/>
+    <p:notesMasterId r:id="rId60"/>
   </p:notesMasterIdLst>
   <p:sldIdLst>
     <p:sldId id="256" r:id="rId2"/>
@@ -62,8 +62,10 @@
     <p:sldId id="392" r:id="rId53"/>
     <p:sldId id="393" r:id="rId54"/>
     <p:sldId id="394" r:id="rId55"/>
-    <p:sldId id="358" r:id="rId56"/>
-    <p:sldId id="336" r:id="rId57"/>
+    <p:sldId id="395" r:id="rId56"/>
+    <p:sldId id="396" r:id="rId57"/>
+    <p:sldId id="358" r:id="rId58"/>
+    <p:sldId id="336" r:id="rId59"/>
   </p:sldIdLst>
   <p:sldSz cx="12192000" cy="6858000"/>
   <p:notesSz cx="6858000" cy="9144000"/>
@@ -17306,7 +17308,7 @@
           <a:p>
             <a:fld id="{83484A92-80DB-45F2-84F5-0D1BF1E89935}" type="datetimeFigureOut">
               <a:rPr lang="fr-CA" smtClean="0"/>
-              <a:t>2018-05-02</a:t>
+              <a:t>2018-05-08</a:t>
             </a:fld>
             <a:endParaRPr lang="fr-CA"/>
           </a:p>
@@ -17705,7 +17707,7 @@
           <a:p>
             <a:fld id="{7946004B-0E6B-4AC3-A8D3-BFF0512C2F93}" type="datetimeFigureOut">
               <a:rPr lang="fr-CA" smtClean="0"/>
-              <a:t>2018-05-02</a:t>
+              <a:t>2018-05-08</a:t>
             </a:fld>
             <a:endParaRPr lang="fr-CA"/>
           </a:p>
@@ -17875,7 +17877,7 @@
           <a:p>
             <a:fld id="{7946004B-0E6B-4AC3-A8D3-BFF0512C2F93}" type="datetimeFigureOut">
               <a:rPr lang="fr-CA" smtClean="0"/>
-              <a:t>2018-05-02</a:t>
+              <a:t>2018-05-08</a:t>
             </a:fld>
             <a:endParaRPr lang="fr-CA"/>
           </a:p>
@@ -18055,7 +18057,7 @@
           <a:p>
             <a:fld id="{7946004B-0E6B-4AC3-A8D3-BFF0512C2F93}" type="datetimeFigureOut">
               <a:rPr lang="fr-CA" smtClean="0"/>
-              <a:t>2018-05-02</a:t>
+              <a:t>2018-05-08</a:t>
             </a:fld>
             <a:endParaRPr lang="fr-CA"/>
           </a:p>
@@ -18225,7 +18227,7 @@
           <a:p>
             <a:fld id="{7946004B-0E6B-4AC3-A8D3-BFF0512C2F93}" type="datetimeFigureOut">
               <a:rPr lang="fr-CA" smtClean="0"/>
-              <a:t>2018-05-02</a:t>
+              <a:t>2018-05-08</a:t>
             </a:fld>
             <a:endParaRPr lang="fr-CA"/>
           </a:p>
@@ -18471,7 +18473,7 @@
           <a:p>
             <a:fld id="{7946004B-0E6B-4AC3-A8D3-BFF0512C2F93}" type="datetimeFigureOut">
               <a:rPr lang="fr-CA" smtClean="0"/>
-              <a:t>2018-05-02</a:t>
+              <a:t>2018-05-08</a:t>
             </a:fld>
             <a:endParaRPr lang="fr-CA"/>
           </a:p>
@@ -18703,7 +18705,7 @@
           <a:p>
             <a:fld id="{7946004B-0E6B-4AC3-A8D3-BFF0512C2F93}" type="datetimeFigureOut">
               <a:rPr lang="fr-CA" smtClean="0"/>
-              <a:t>2018-05-02</a:t>
+              <a:t>2018-05-08</a:t>
             </a:fld>
             <a:endParaRPr lang="fr-CA"/>
           </a:p>
@@ -19070,7 +19072,7 @@
           <a:p>
             <a:fld id="{7946004B-0E6B-4AC3-A8D3-BFF0512C2F93}" type="datetimeFigureOut">
               <a:rPr lang="fr-CA" smtClean="0"/>
-              <a:t>2018-05-02</a:t>
+              <a:t>2018-05-08</a:t>
             </a:fld>
             <a:endParaRPr lang="fr-CA"/>
           </a:p>
@@ -19188,7 +19190,7 @@
           <a:p>
             <a:fld id="{7946004B-0E6B-4AC3-A8D3-BFF0512C2F93}" type="datetimeFigureOut">
               <a:rPr lang="fr-CA" smtClean="0"/>
-              <a:t>2018-05-02</a:t>
+              <a:t>2018-05-08</a:t>
             </a:fld>
             <a:endParaRPr lang="fr-CA"/>
           </a:p>
@@ -19283,7 +19285,7 @@
           <a:p>
             <a:fld id="{7946004B-0E6B-4AC3-A8D3-BFF0512C2F93}" type="datetimeFigureOut">
               <a:rPr lang="fr-CA" smtClean="0"/>
-              <a:t>2018-05-02</a:t>
+              <a:t>2018-05-08</a:t>
             </a:fld>
             <a:endParaRPr lang="fr-CA"/>
           </a:p>
@@ -19560,7 +19562,7 @@
           <a:p>
             <a:fld id="{7946004B-0E6B-4AC3-A8D3-BFF0512C2F93}" type="datetimeFigureOut">
               <a:rPr lang="fr-CA" smtClean="0"/>
-              <a:t>2018-05-02</a:t>
+              <a:t>2018-05-08</a:t>
             </a:fld>
             <a:endParaRPr lang="fr-CA"/>
           </a:p>
@@ -19817,7 +19819,7 @@
           <a:p>
             <a:fld id="{7946004B-0E6B-4AC3-A8D3-BFF0512C2F93}" type="datetimeFigureOut">
               <a:rPr lang="fr-CA" smtClean="0"/>
-              <a:t>2018-05-02</a:t>
+              <a:t>2018-05-08</a:t>
             </a:fld>
             <a:endParaRPr lang="fr-CA"/>
           </a:p>
@@ -20030,7 +20032,7 @@
           <a:p>
             <a:fld id="{7946004B-0E6B-4AC3-A8D3-BFF0512C2F93}" type="datetimeFigureOut">
               <a:rPr lang="fr-CA" smtClean="0"/>
-              <a:t>2018-05-02</a:t>
+              <a:t>2018-05-08</a:t>
             </a:fld>
             <a:endParaRPr lang="fr-CA"/>
           </a:p>
@@ -24364,43 +24366,21 @@
           </a:xfrm>
           <a:prstGeom prst="roundRect">
             <a:avLst>
-              <a:gd name="adj" fmla="val 11111"/>
+              <a:gd name="adj" fmla="val 8594"/>
             </a:avLst>
           </a:prstGeom>
-          <a:ln w="190500" cap="rnd">
-            <a:solidFill>
-              <a:srgbClr val="C8C6BD"/>
-            </a:solidFill>
-            <a:prstDash val="solid"/>
+          <a:solidFill>
+            <a:srgbClr val="FFFFFF">
+              <a:shade val="85000"/>
+            </a:srgbClr>
+          </a:solidFill>
+          <a:ln>
+            <a:noFill/>
           </a:ln>
           <a:effectLst>
-            <a:outerShdw blurRad="101600" dist="50800" dir="7200000" algn="tl" rotWithShape="0">
-              <a:srgbClr val="000000">
-                <a:alpha val="45000"/>
-              </a:srgbClr>
-            </a:outerShdw>
+            <a:reflection blurRad="12700" stA="38000" endPos="28000" dist="5000" dir="5400000" sy="-100000" algn="bl" rotWithShape="0"/>
           </a:effectLst>
-          <a:scene3d>
-            <a:camera prst="perspectiveFront" fov="5400000"/>
-            <a:lightRig rig="threePt" dir="t">
-              <a:rot lat="0" lon="0" rev="19200000"/>
-            </a:lightRig>
-          </a:scene3d>
-          <a:sp3d extrusionH="25400">
-            <a:bevelT w="304800" h="152400" prst="hardEdge"/>
-            <a:extrusionClr>
-              <a:srgbClr val="FFFFFF"/>
-            </a:extrusionClr>
-          </a:sp3d>
-          <a:extLst>
-            <a:ext uri="{909E8E84-426E-40DD-AFC4-6F175D3DCCD1}">
-              <a14:hiddenFill xmlns:a14="http://schemas.microsoft.com/office/drawing/2010/main">
-                <a:solidFill>
-                  <a:srgbClr val="FFFFFF"/>
-                </a:solidFill>
-              </a14:hiddenFill>
-            </a:ext>
-          </a:extLst>
+          <a:extLst/>
         </p:spPr>
       </p:pic>
     </p:spTree>
@@ -33681,6 +33661,594 @@
 <file path=ppt/slides/slide55.xml><?xml version="1.0" encoding="utf-8"?>
 <p:sld xmlns:a="http://schemas.openxmlformats.org/drawingml/2006/main" xmlns:r="http://schemas.openxmlformats.org/officeDocument/2006/relationships" xmlns:p="http://schemas.openxmlformats.org/presentationml/2006/main">
   <p:cSld>
+    <p:bg>
+      <p:bgPr>
+        <a:solidFill>
+          <a:schemeClr val="bg2"/>
+        </a:solidFill>
+        <a:effectLst/>
+      </p:bgPr>
+    </p:bg>
+    <p:spTree>
+      <p:nvGrpSpPr>
+        <p:cNvPr id="1" name=""/>
+        <p:cNvGrpSpPr/>
+        <p:nvPr/>
+      </p:nvGrpSpPr>
+      <p:grpSpPr>
+        <a:xfrm>
+          <a:off x="0" y="0"/>
+          <a:ext cx="0" cy="0"/>
+          <a:chOff x="0" y="0"/>
+          <a:chExt cx="0" cy="0"/>
+        </a:xfrm>
+      </p:grpSpPr>
+      <p:sp>
+        <p:nvSpPr>
+          <p:cNvPr id="17" name="Rectangle 16">
+            <a:extLst>
+              <a:ext uri="{FF2B5EF4-FFF2-40B4-BE49-F238E27FC236}">
+                <a16:creationId xmlns:a16="http://schemas.microsoft.com/office/drawing/2014/main" id="{BEE73255-8084-4DF9-BB0B-15EAC92E2CB9}"/>
+              </a:ext>
+            </a:extLst>
+          </p:cNvPr>
+          <p:cNvSpPr>
+            <a:spLocks noGrp="1" noRot="1" noChangeAspect="1" noMove="1" noResize="1" noEditPoints="1" noAdjustHandles="1" noChangeArrowheads="1" noChangeShapeType="1" noTextEdit="1"/>
+          </p:cNvSpPr>
+          <p:nvPr>
+            <p:extLst>
+              <p:ext uri="{386F3935-93C4-4BCD-93E2-E3B085C9AB24}">
+                <p16:designElem xmlns:p16="http://schemas.microsoft.com/office/powerpoint/2015/main" val="1"/>
+              </p:ext>
+            </p:extLst>
+          </p:nvPr>
+        </p:nvSpPr>
+        <p:spPr>
+          <a:xfrm>
+            <a:off x="0" y="0"/>
+            <a:ext cx="12192000" cy="6858000"/>
+          </a:xfrm>
+          <a:prstGeom prst="rect">
+            <a:avLst/>
+          </a:prstGeom>
+          <a:solidFill>
+            <a:srgbClr val="C8CACA"/>
+          </a:solidFill>
+          <a:ln>
+            <a:noFill/>
+          </a:ln>
+        </p:spPr>
+        <p:style>
+          <a:lnRef idx="2">
+            <a:schemeClr val="accent1">
+              <a:shade val="50000"/>
+            </a:schemeClr>
+          </a:lnRef>
+          <a:fillRef idx="1">
+            <a:schemeClr val="accent1"/>
+          </a:fillRef>
+          <a:effectRef idx="0">
+            <a:schemeClr val="accent1"/>
+          </a:effectRef>
+          <a:fontRef idx="minor">
+            <a:schemeClr val="lt1"/>
+          </a:fontRef>
+        </p:style>
+        <p:txBody>
+          <a:bodyPr rtlCol="0" anchor="ctr"/>
+          <a:lstStyle/>
+          <a:p>
+            <a:pPr algn="ctr"/>
+            <a:endParaRPr lang="en-US"/>
+          </a:p>
+        </p:txBody>
+      </p:sp>
+      <p:sp>
+        <p:nvSpPr>
+          <p:cNvPr id="19" name="Rounded Rectangle 9">
+            <a:extLst>
+              <a:ext uri="{FF2B5EF4-FFF2-40B4-BE49-F238E27FC236}">
+                <a16:creationId xmlns:a16="http://schemas.microsoft.com/office/drawing/2014/main" id="{67048353-8981-459A-9BC6-9711CE462E06}"/>
+              </a:ext>
+            </a:extLst>
+          </p:cNvPr>
+          <p:cNvSpPr>
+            <a:spLocks noGrp="1" noRot="1" noChangeAspect="1" noMove="1" noResize="1" noEditPoints="1" noAdjustHandles="1" noChangeArrowheads="1" noChangeShapeType="1" noTextEdit="1"/>
+          </p:cNvSpPr>
+          <p:nvPr>
+            <p:extLst>
+              <p:ext uri="{386F3935-93C4-4BCD-93E2-E3B085C9AB24}">
+                <p16:designElem xmlns:p16="http://schemas.microsoft.com/office/powerpoint/2015/main" val="1"/>
+              </p:ext>
+            </p:extLst>
+          </p:nvPr>
+        </p:nvSpPr>
+        <p:spPr>
+          <a:xfrm>
+            <a:off x="3580067" y="484632"/>
+            <a:ext cx="8129016" cy="5724144"/>
+          </a:xfrm>
+          <a:prstGeom prst="roundRect">
+            <a:avLst>
+              <a:gd name="adj" fmla="val 0"/>
+            </a:avLst>
+          </a:prstGeom>
+          <a:solidFill>
+            <a:srgbClr val="FFFFFF"/>
+          </a:solidFill>
+          <a:ln w="9525">
+            <a:solidFill>
+              <a:srgbClr val="C8CACA"/>
+            </a:solidFill>
+          </a:ln>
+          <a:effectLst>
+            <a:outerShdw blurRad="57150" dist="19050" dir="5400000" algn="t" rotWithShape="0">
+              <a:prstClr val="black">
+                <a:alpha val="63000"/>
+              </a:prstClr>
+            </a:outerShdw>
+          </a:effectLst>
+        </p:spPr>
+        <p:style>
+          <a:lnRef idx="2">
+            <a:schemeClr val="accent1">
+              <a:shade val="50000"/>
+            </a:schemeClr>
+          </a:lnRef>
+          <a:fillRef idx="1">
+            <a:schemeClr val="accent1"/>
+          </a:fillRef>
+          <a:effectRef idx="0">
+            <a:schemeClr val="accent1"/>
+          </a:effectRef>
+          <a:fontRef idx="minor">
+            <a:schemeClr val="lt1"/>
+          </a:fontRef>
+        </p:style>
+        <p:txBody>
+          <a:bodyPr rtlCol="0" anchor="ctr"/>
+          <a:lstStyle/>
+          <a:p>
+            <a:pPr algn="ctr"/>
+            <a:endParaRPr lang="en-US"/>
+          </a:p>
+        </p:txBody>
+      </p:sp>
+      <p:sp>
+        <p:nvSpPr>
+          <p:cNvPr id="2" name="Titre 1">
+            <a:extLst>
+              <a:ext uri="{FF2B5EF4-FFF2-40B4-BE49-F238E27FC236}">
+                <a16:creationId xmlns:a16="http://schemas.microsoft.com/office/drawing/2014/main" id="{FFB9E06A-0EFE-4D3C-9E37-F8F5E53D96A3}"/>
+              </a:ext>
+            </a:extLst>
+          </p:cNvPr>
+          <p:cNvSpPr>
+            <a:spLocks noGrp="1"/>
+          </p:cNvSpPr>
+          <p:nvPr>
+            <p:ph type="title"/>
+          </p:nvPr>
+        </p:nvSpPr>
+        <p:spPr>
+          <a:xfrm>
+            <a:off x="457200" y="640081"/>
+            <a:ext cx="2901303" cy="5257799"/>
+          </a:xfrm>
+        </p:spPr>
+        <p:txBody>
+          <a:bodyPr vert="horz" lIns="91440" tIns="45720" rIns="91440" bIns="45720" rtlCol="0" anchor="ctr">
+            <a:normAutofit/>
+          </a:bodyPr>
+          <a:lstStyle/>
+          <a:p>
+            <a:r>
+              <a:rPr lang="en-US" sz="3600" dirty="0">
+                <a:solidFill>
+                  <a:srgbClr val="2C2C2C"/>
+                </a:solidFill>
+              </a:rPr>
+              <a:t>Une </a:t>
+            </a:r>
+            <a:r>
+              <a:rPr lang="en-US" sz="3600" dirty="0" err="1">
+                <a:solidFill>
+                  <a:srgbClr val="2C2C2C"/>
+                </a:solidFill>
+              </a:rPr>
+              <a:t>seule</a:t>
+            </a:r>
+            <a:r>
+              <a:rPr lang="en-US" sz="3600" dirty="0">
+                <a:solidFill>
+                  <a:srgbClr val="2C2C2C"/>
+                </a:solidFill>
+              </a:rPr>
+              <a:t> function!</a:t>
+            </a:r>
+          </a:p>
+        </p:txBody>
+      </p:sp>
+      <p:sp>
+        <p:nvSpPr>
+          <p:cNvPr id="4" name="Rectangle 3">
+            <a:extLst>
+              <a:ext uri="{FF2B5EF4-FFF2-40B4-BE49-F238E27FC236}">
+                <a16:creationId xmlns:a16="http://schemas.microsoft.com/office/drawing/2014/main" id="{F83F5277-9BD9-4096-8D47-AFA60F012A43}"/>
+              </a:ext>
+            </a:extLst>
+          </p:cNvPr>
+          <p:cNvSpPr/>
+          <p:nvPr/>
+        </p:nvSpPr>
+        <p:spPr>
+          <a:xfrm>
+            <a:off x="6875775" y="2766161"/>
+            <a:ext cx="1537600" cy="830997"/>
+          </a:xfrm>
+          <a:prstGeom prst="rect">
+            <a:avLst/>
+          </a:prstGeom>
+        </p:spPr>
+        <p:txBody>
+          <a:bodyPr wrap="none">
+            <a:spAutoFit/>
+          </a:bodyPr>
+          <a:lstStyle/>
+          <a:p>
+            <a:r>
+              <a:rPr lang="fr-CA" sz="4800" dirty="0">
+                <a:latin typeface="Consolas" panose="020B0609020204030204" pitchFamily="49" charset="0"/>
+                <a:cs typeface="Consolas" panose="020B0609020204030204" pitchFamily="49" charset="0"/>
+              </a:rPr>
+              <a:t>$();</a:t>
+            </a:r>
+          </a:p>
+        </p:txBody>
+      </p:sp>
+      <p:sp>
+        <p:nvSpPr>
+          <p:cNvPr id="5" name="ZoneTexte 4">
+            <a:extLst>
+              <a:ext uri="{FF2B5EF4-FFF2-40B4-BE49-F238E27FC236}">
+                <a16:creationId xmlns:a16="http://schemas.microsoft.com/office/drawing/2014/main" id="{AF3531C9-D1B8-4E9E-9F21-190EF216550B}"/>
+              </a:ext>
+            </a:extLst>
+          </p:cNvPr>
+          <p:cNvSpPr txBox="1"/>
+          <p:nvPr/>
+        </p:nvSpPr>
+        <p:spPr>
+          <a:xfrm>
+            <a:off x="7340367" y="4228052"/>
+            <a:ext cx="2955424" cy="369332"/>
+          </a:xfrm>
+          <a:prstGeom prst="rect">
+            <a:avLst/>
+          </a:prstGeom>
+          <a:noFill/>
+        </p:spPr>
+        <p:txBody>
+          <a:bodyPr wrap="none" rtlCol="0">
+            <a:spAutoFit/>
+          </a:bodyPr>
+          <a:lstStyle/>
+          <a:p>
+            <a:r>
+              <a:rPr lang="fr-CA" dirty="0"/>
+              <a:t>Oui… la fonction s’appelle ‘$’!</a:t>
+            </a:r>
+          </a:p>
+        </p:txBody>
+      </p:sp>
+    </p:spTree>
+    <p:extLst>
+      <p:ext uri="{BB962C8B-B14F-4D97-AF65-F5344CB8AC3E}">
+        <p14:creationId xmlns:p14="http://schemas.microsoft.com/office/powerpoint/2010/main" val="895032050"/>
+      </p:ext>
+    </p:extLst>
+  </p:cSld>
+  <p:clrMapOvr>
+    <a:masterClrMapping/>
+  </p:clrMapOvr>
+</p:sld>
+</file>
+
+<file path=ppt/slides/slide56.xml><?xml version="1.0" encoding="utf-8"?>
+<p:sld xmlns:a="http://schemas.openxmlformats.org/drawingml/2006/main" xmlns:r="http://schemas.openxmlformats.org/officeDocument/2006/relationships" xmlns:p="http://schemas.openxmlformats.org/presentationml/2006/main">
+  <p:cSld>
+    <p:bg>
+      <p:bgPr>
+        <a:solidFill>
+          <a:schemeClr val="bg2"/>
+        </a:solidFill>
+        <a:effectLst/>
+      </p:bgPr>
+    </p:bg>
+    <p:spTree>
+      <p:nvGrpSpPr>
+        <p:cNvPr id="1" name=""/>
+        <p:cNvGrpSpPr/>
+        <p:nvPr/>
+      </p:nvGrpSpPr>
+      <p:grpSpPr>
+        <a:xfrm>
+          <a:off x="0" y="0"/>
+          <a:ext cx="0" cy="0"/>
+          <a:chOff x="0" y="0"/>
+          <a:chExt cx="0" cy="0"/>
+        </a:xfrm>
+      </p:grpSpPr>
+      <p:sp>
+        <p:nvSpPr>
+          <p:cNvPr id="17" name="Rectangle 16">
+            <a:extLst>
+              <a:ext uri="{FF2B5EF4-FFF2-40B4-BE49-F238E27FC236}">
+                <a16:creationId xmlns:a16="http://schemas.microsoft.com/office/drawing/2014/main" id="{BEE73255-8084-4DF9-BB0B-15EAC92E2CB9}"/>
+              </a:ext>
+            </a:extLst>
+          </p:cNvPr>
+          <p:cNvSpPr>
+            <a:spLocks noGrp="1" noRot="1" noChangeAspect="1" noMove="1" noResize="1" noEditPoints="1" noAdjustHandles="1" noChangeArrowheads="1" noChangeShapeType="1" noTextEdit="1"/>
+          </p:cNvSpPr>
+          <p:nvPr>
+            <p:extLst>
+              <p:ext uri="{386F3935-93C4-4BCD-93E2-E3B085C9AB24}">
+                <p16:designElem xmlns:p16="http://schemas.microsoft.com/office/powerpoint/2015/main" val="1"/>
+              </p:ext>
+            </p:extLst>
+          </p:nvPr>
+        </p:nvSpPr>
+        <p:spPr>
+          <a:xfrm>
+            <a:off x="0" y="0"/>
+            <a:ext cx="12192000" cy="6858000"/>
+          </a:xfrm>
+          <a:prstGeom prst="rect">
+            <a:avLst/>
+          </a:prstGeom>
+          <a:solidFill>
+            <a:srgbClr val="C8CACA"/>
+          </a:solidFill>
+          <a:ln>
+            <a:noFill/>
+          </a:ln>
+        </p:spPr>
+        <p:style>
+          <a:lnRef idx="2">
+            <a:schemeClr val="accent1">
+              <a:shade val="50000"/>
+            </a:schemeClr>
+          </a:lnRef>
+          <a:fillRef idx="1">
+            <a:schemeClr val="accent1"/>
+          </a:fillRef>
+          <a:effectRef idx="0">
+            <a:schemeClr val="accent1"/>
+          </a:effectRef>
+          <a:fontRef idx="minor">
+            <a:schemeClr val="lt1"/>
+          </a:fontRef>
+        </p:style>
+        <p:txBody>
+          <a:bodyPr rtlCol="0" anchor="ctr"/>
+          <a:lstStyle/>
+          <a:p>
+            <a:pPr algn="ctr"/>
+            <a:endParaRPr lang="en-US"/>
+          </a:p>
+        </p:txBody>
+      </p:sp>
+      <p:sp>
+        <p:nvSpPr>
+          <p:cNvPr id="19" name="Rounded Rectangle 9">
+            <a:extLst>
+              <a:ext uri="{FF2B5EF4-FFF2-40B4-BE49-F238E27FC236}">
+                <a16:creationId xmlns:a16="http://schemas.microsoft.com/office/drawing/2014/main" id="{67048353-8981-459A-9BC6-9711CE462E06}"/>
+              </a:ext>
+            </a:extLst>
+          </p:cNvPr>
+          <p:cNvSpPr>
+            <a:spLocks noGrp="1" noRot="1" noChangeAspect="1" noMove="1" noResize="1" noEditPoints="1" noAdjustHandles="1" noChangeArrowheads="1" noChangeShapeType="1" noTextEdit="1"/>
+          </p:cNvSpPr>
+          <p:nvPr>
+            <p:extLst>
+              <p:ext uri="{386F3935-93C4-4BCD-93E2-E3B085C9AB24}">
+                <p16:designElem xmlns:p16="http://schemas.microsoft.com/office/powerpoint/2015/main" val="1"/>
+              </p:ext>
+            </p:extLst>
+          </p:nvPr>
+        </p:nvSpPr>
+        <p:spPr>
+          <a:xfrm>
+            <a:off x="3580067" y="484632"/>
+            <a:ext cx="8129016" cy="5724144"/>
+          </a:xfrm>
+          <a:prstGeom prst="roundRect">
+            <a:avLst>
+              <a:gd name="adj" fmla="val 0"/>
+            </a:avLst>
+          </a:prstGeom>
+          <a:solidFill>
+            <a:srgbClr val="FFFFFF"/>
+          </a:solidFill>
+          <a:ln w="9525">
+            <a:solidFill>
+              <a:srgbClr val="C8CACA"/>
+            </a:solidFill>
+          </a:ln>
+          <a:effectLst>
+            <a:outerShdw blurRad="57150" dist="19050" dir="5400000" algn="t" rotWithShape="0">
+              <a:prstClr val="black">
+                <a:alpha val="63000"/>
+              </a:prstClr>
+            </a:outerShdw>
+          </a:effectLst>
+        </p:spPr>
+        <p:style>
+          <a:lnRef idx="2">
+            <a:schemeClr val="accent1">
+              <a:shade val="50000"/>
+            </a:schemeClr>
+          </a:lnRef>
+          <a:fillRef idx="1">
+            <a:schemeClr val="accent1"/>
+          </a:fillRef>
+          <a:effectRef idx="0">
+            <a:schemeClr val="accent1"/>
+          </a:effectRef>
+          <a:fontRef idx="minor">
+            <a:schemeClr val="lt1"/>
+          </a:fontRef>
+        </p:style>
+        <p:txBody>
+          <a:bodyPr rtlCol="0" anchor="ctr"/>
+          <a:lstStyle/>
+          <a:p>
+            <a:pPr algn="ctr"/>
+            <a:endParaRPr lang="en-US"/>
+          </a:p>
+        </p:txBody>
+      </p:sp>
+      <p:sp>
+        <p:nvSpPr>
+          <p:cNvPr id="2" name="Titre 1">
+            <a:extLst>
+              <a:ext uri="{FF2B5EF4-FFF2-40B4-BE49-F238E27FC236}">
+                <a16:creationId xmlns:a16="http://schemas.microsoft.com/office/drawing/2014/main" id="{FFB9E06A-0EFE-4D3C-9E37-F8F5E53D96A3}"/>
+              </a:ext>
+            </a:extLst>
+          </p:cNvPr>
+          <p:cNvSpPr>
+            <a:spLocks noGrp="1"/>
+          </p:cNvSpPr>
+          <p:nvPr>
+            <p:ph type="title"/>
+          </p:nvPr>
+        </p:nvSpPr>
+        <p:spPr>
+          <a:xfrm>
+            <a:off x="457200" y="640081"/>
+            <a:ext cx="2901303" cy="5257799"/>
+          </a:xfrm>
+        </p:spPr>
+        <p:txBody>
+          <a:bodyPr vert="horz" lIns="91440" tIns="45720" rIns="91440" bIns="45720" rtlCol="0" anchor="ctr">
+            <a:normAutofit/>
+          </a:bodyPr>
+          <a:lstStyle/>
+          <a:p>
+            <a:r>
+              <a:rPr lang="en-US" sz="3600" dirty="0" err="1">
+                <a:solidFill>
+                  <a:srgbClr val="2C2C2C"/>
+                </a:solidFill>
+              </a:rPr>
+              <a:t>Sélecteurs</a:t>
+            </a:r>
+            <a:r>
+              <a:rPr lang="en-US" sz="3600" dirty="0">
+                <a:solidFill>
+                  <a:srgbClr val="2C2C2C"/>
+                </a:solidFill>
+              </a:rPr>
+              <a:t> CSS</a:t>
+            </a:r>
+          </a:p>
+        </p:txBody>
+      </p:sp>
+      <p:sp>
+        <p:nvSpPr>
+          <p:cNvPr id="5" name="ZoneTexte 4">
+            <a:extLst>
+              <a:ext uri="{FF2B5EF4-FFF2-40B4-BE49-F238E27FC236}">
+                <a16:creationId xmlns:a16="http://schemas.microsoft.com/office/drawing/2014/main" id="{AF3531C9-D1B8-4E9E-9F21-190EF216550B}"/>
+              </a:ext>
+            </a:extLst>
+          </p:cNvPr>
+          <p:cNvSpPr txBox="1"/>
+          <p:nvPr/>
+        </p:nvSpPr>
+        <p:spPr>
+          <a:xfrm>
+            <a:off x="7331978" y="3737104"/>
+            <a:ext cx="4008598" cy="369332"/>
+          </a:xfrm>
+          <a:prstGeom prst="rect">
+            <a:avLst/>
+          </a:prstGeom>
+          <a:noFill/>
+        </p:spPr>
+        <p:txBody>
+          <a:bodyPr wrap="none" rtlCol="0">
+            <a:spAutoFit/>
+          </a:bodyPr>
+          <a:lstStyle/>
+          <a:p>
+            <a:r>
+              <a:rPr lang="fr-CA" dirty="0"/>
+              <a:t>Permet de faire une requête sur le DOM.</a:t>
+            </a:r>
+          </a:p>
+        </p:txBody>
+      </p:sp>
+      <p:sp>
+        <p:nvSpPr>
+          <p:cNvPr id="3" name="ZoneTexte 2">
+            <a:extLst>
+              <a:ext uri="{FF2B5EF4-FFF2-40B4-BE49-F238E27FC236}">
+                <a16:creationId xmlns:a16="http://schemas.microsoft.com/office/drawing/2014/main" id="{C25D5219-31AB-43AB-8525-D1CD32FE4817}"/>
+              </a:ext>
+            </a:extLst>
+          </p:cNvPr>
+          <p:cNvSpPr txBox="1"/>
+          <p:nvPr/>
+        </p:nvSpPr>
+        <p:spPr>
+          <a:xfrm>
+            <a:off x="6811861" y="2256639"/>
+            <a:ext cx="832714" cy="646331"/>
+          </a:xfrm>
+          <a:prstGeom prst="rect">
+            <a:avLst/>
+          </a:prstGeom>
+          <a:noFill/>
+        </p:spPr>
+        <p:txBody>
+          <a:bodyPr wrap="square" rtlCol="0">
+            <a:spAutoFit/>
+          </a:bodyPr>
+          <a:lstStyle/>
+          <a:p>
+            <a:r>
+              <a:rPr lang="fr-CA" dirty="0">
+                <a:latin typeface="Consolas" panose="020B0609020204030204" pitchFamily="49" charset="0"/>
+                <a:cs typeface="Consolas" panose="020B0609020204030204" pitchFamily="49" charset="0"/>
+              </a:rPr>
+              <a:t>$();</a:t>
+            </a:r>
+          </a:p>
+          <a:p>
+            <a:endParaRPr lang="fr-CA" dirty="0"/>
+          </a:p>
+        </p:txBody>
+      </p:sp>
+    </p:spTree>
+    <p:extLst>
+      <p:ext uri="{BB962C8B-B14F-4D97-AF65-F5344CB8AC3E}">
+        <p14:creationId xmlns:p14="http://schemas.microsoft.com/office/powerpoint/2010/main" val="3518525763"/>
+      </p:ext>
+    </p:extLst>
+  </p:cSld>
+  <p:clrMapOvr>
+    <a:masterClrMapping/>
+  </p:clrMapOvr>
+</p:sld>
+</file>
+
+<file path=ppt/slides/slide57.xml><?xml version="1.0" encoding="utf-8"?>
+<p:sld xmlns:a="http://schemas.openxmlformats.org/drawingml/2006/main" xmlns:r="http://schemas.openxmlformats.org/officeDocument/2006/relationships" xmlns:p="http://schemas.openxmlformats.org/presentationml/2006/main">
+  <p:cSld>
     <p:spTree>
       <p:nvGrpSpPr>
         <p:cNvPr id="1" name=""/>
@@ -33767,7 +34335,7 @@
 </p:sld>
 </file>
 
-<file path=ppt/slides/slide56.xml><?xml version="1.0" encoding="utf-8"?>
+<file path=ppt/slides/slide58.xml><?xml version="1.0" encoding="utf-8"?>
 <p:sld xmlns:a="http://schemas.openxmlformats.org/drawingml/2006/main" xmlns:r="http://schemas.openxmlformats.org/officeDocument/2006/relationships" xmlns:p="http://schemas.openxmlformats.org/presentationml/2006/main">
   <p:cSld>
     <p:bg>
@@ -35121,6 +35689,47 @@
           </a:p>
         </p:txBody>
       </p:sp>
+      <p:sp>
+        <p:nvSpPr>
+          <p:cNvPr id="4" name="ZoneTexte 3">
+            <a:extLst>
+              <a:ext uri="{FF2B5EF4-FFF2-40B4-BE49-F238E27FC236}">
+                <a16:creationId xmlns:a16="http://schemas.microsoft.com/office/drawing/2014/main" id="{074DFE53-B644-4135-809D-B881B51E4408}"/>
+              </a:ext>
+            </a:extLst>
+          </p:cNvPr>
+          <p:cNvSpPr txBox="1"/>
+          <p:nvPr/>
+        </p:nvSpPr>
+        <p:spPr>
+          <a:xfrm>
+            <a:off x="9823508" y="2642532"/>
+            <a:ext cx="274434" cy="369332"/>
+          </a:xfrm>
+          <a:prstGeom prst="rect">
+            <a:avLst/>
+          </a:prstGeom>
+          <a:noFill/>
+        </p:spPr>
+        <p:txBody>
+          <a:bodyPr wrap="none" rtlCol="0">
+            <a:spAutoFit/>
+          </a:bodyPr>
+          <a:lstStyle/>
+          <a:p>
+            <a:r>
+              <a:rPr lang="fr-CA" dirty="0">
+                <a:solidFill>
+                  <a:schemeClr val="accent2">
+                    <a:lumMod val="75000"/>
+                  </a:schemeClr>
+                </a:solidFill>
+              </a:rPr>
+              <a:t>s</a:t>
+            </a:r>
+          </a:p>
+        </p:txBody>
+      </p:sp>
     </p:spTree>
     <p:extLst>
       <p:ext uri="{BB962C8B-B14F-4D97-AF65-F5344CB8AC3E}">

</xml_diff>